<commit_message>
[add] complete 2-22 sched
</commit_message>
<xml_diff>
--- a/slides-new/2-22-sched.pptx
+++ b/slides-new/2-22-sched.pptx
@@ -344,7 +344,7 @@
             </a:extLst>
           </p:cNvPr>
           <p:cNvSpPr>
-            <a:spLocks noChangeArrowheads="1" noTextEdit="1"/>
+            <a:spLocks noGrp="1" noRot="1" noChangeAspect="1" noChangeArrowheads="1" noTextEdit="1"/>
           </p:cNvSpPr>
           <p:nvPr>
             <p:ph type="sldImg" idx="2"/>
@@ -882,7 +882,7 @@
             </a:extLst>
           </p:cNvPr>
           <p:cNvSpPr>
-            <a:spLocks noChangeArrowheads="1" noTextEdit="1"/>
+            <a:spLocks noGrp="1" noRot="1" noChangeAspect="1" noChangeArrowheads="1" noTextEdit="1"/>
           </p:cNvSpPr>
           <p:nvPr>
             <p:ph type="sldImg"/>
@@ -3477,7 +3477,7 @@
             </a:extLst>
           </p:cNvPr>
           <p:cNvSpPr>
-            <a:spLocks noChangeArrowheads="1" noTextEdit="1"/>
+            <a:spLocks noGrp="1" noRot="1" noChangeAspect="1" noChangeArrowheads="1" noTextEdit="1"/>
           </p:cNvSpPr>
           <p:nvPr>
             <p:ph type="sldImg"/>
@@ -4434,7 +4434,7 @@
             </a:extLst>
           </p:cNvPr>
           <p:cNvSpPr>
-            <a:spLocks noChangeArrowheads="1" noTextEdit="1"/>
+            <a:spLocks noGrp="1" noRot="1" noChangeAspect="1" noChangeArrowheads="1" noTextEdit="1"/>
           </p:cNvSpPr>
           <p:nvPr>
             <p:ph type="sldImg"/>
@@ -11639,7 +11639,7 @@
               <a:pPr>
                 <a:defRPr/>
               </a:pPr>
-              <a:t>2020/9/24</a:t>
+              <a:t>2020/9/27</a:t>
             </a:fld>
             <a:endParaRPr lang="en-US" altLang="zh-CN"/>
           </a:p>
@@ -11863,7 +11863,7 @@
               <a:pPr>
                 <a:defRPr/>
               </a:pPr>
-              <a:t>2020/9/24</a:t>
+              <a:t>2020/9/27</a:t>
             </a:fld>
             <a:endParaRPr lang="en-US" altLang="zh-CN"/>
           </a:p>
@@ -12091,7 +12091,7 @@
               <a:pPr>
                 <a:defRPr/>
               </a:pPr>
-              <a:t>2020/9/24</a:t>
+              <a:t>2020/9/27</a:t>
             </a:fld>
             <a:endParaRPr lang="en-US" altLang="zh-CN"/>
           </a:p>
@@ -12309,7 +12309,7 @@
               <a:pPr>
                 <a:defRPr/>
               </a:pPr>
-              <a:t>2020/9/24</a:t>
+              <a:t>2020/9/27</a:t>
             </a:fld>
             <a:endParaRPr lang="en-US" altLang="zh-CN"/>
           </a:p>
@@ -12550,7 +12550,7 @@
               <a:pPr>
                 <a:defRPr/>
               </a:pPr>
-              <a:t>2020/9/24</a:t>
+              <a:t>2020/9/27</a:t>
             </a:fld>
             <a:endParaRPr lang="en-US" altLang="zh-CN"/>
           </a:p>
@@ -12885,7 +12885,7 @@
               <a:pPr>
                 <a:defRPr/>
               </a:pPr>
-              <a:t>2020/9/24</a:t>
+              <a:t>2020/9/27</a:t>
             </a:fld>
             <a:endParaRPr lang="en-US" altLang="zh-CN"/>
           </a:p>
@@ -13359,7 +13359,7 @@
               <a:pPr>
                 <a:defRPr/>
               </a:pPr>
-              <a:t>2020/9/24</a:t>
+              <a:t>2020/9/27</a:t>
             </a:fld>
             <a:endParaRPr lang="en-US" altLang="zh-CN"/>
           </a:p>
@@ -13526,7 +13526,7 @@
               <a:pPr>
                 <a:defRPr/>
               </a:pPr>
-              <a:t>2020/9/24</a:t>
+              <a:t>2020/9/27</a:t>
             </a:fld>
             <a:endParaRPr lang="en-US" altLang="zh-CN"/>
           </a:p>
@@ -13671,7 +13671,7 @@
               <a:pPr>
                 <a:defRPr/>
               </a:pPr>
-              <a:t>2020/9/24</a:t>
+              <a:t>2020/9/27</a:t>
             </a:fld>
             <a:endParaRPr lang="en-US" altLang="zh-CN"/>
           </a:p>
@@ -13996,7 +13996,7 @@
               <a:pPr>
                 <a:defRPr/>
               </a:pPr>
-              <a:t>2020/9/24</a:t>
+              <a:t>2020/9/27</a:t>
             </a:fld>
             <a:endParaRPr lang="en-US" altLang="zh-CN"/>
           </a:p>
@@ -14299,7 +14299,7 @@
               <a:pPr>
                 <a:defRPr/>
               </a:pPr>
-              <a:t>2020/9/24</a:t>
+              <a:t>2020/9/27</a:t>
             </a:fld>
             <a:endParaRPr lang="en-US" altLang="zh-CN"/>
           </a:p>
@@ -14628,7 +14628,7 @@
               <a:pPr>
                 <a:defRPr/>
               </a:pPr>
-              <a:t>2020/9/24</a:t>
+              <a:t>2020/9/27</a:t>
             </a:fld>
             <a:endParaRPr lang="en-US" altLang="zh-CN"/>
           </a:p>
@@ -25126,7 +25126,7 @@
               <a:rPr lang="en-US" altLang="zh-CN" b="0" dirty="0">
                 <a:latin typeface="FandolSong" pitchFamily="2" charset="-128"/>
               </a:rPr>
-              <a:t>If it actually is a short job</a:t>
+              <a:t>If it is a short job</a:t>
             </a:r>
           </a:p>
           <a:p>

</xml_diff>